<commit_message>
game basically finish, before prepare to CR
</commit_message>
<xml_diff>
--- a/uml.pptx
+++ b/uml.pptx
@@ -7,6 +7,8 @@
   <p:sldIdLst>
     <p:sldId id="256" r:id="rId2"/>
     <p:sldId id="257" r:id="rId3"/>
+    <p:sldId id="258" r:id="rId4"/>
+    <p:sldId id="259" r:id="rId5"/>
   </p:sldIdLst>
   <p:sldSz cx="12192000" cy="6858000"/>
   <p:notesSz cx="6858000" cy="9144000"/>
@@ -4586,7 +4588,7 @@
               </a:r>
               <a:r>
                 <a:rPr lang="en-US" dirty="0"/>
-                <a:t>: Move[] </a:t>
+                <a:t>: Move[] ???</a:t>
               </a:r>
             </a:p>
             <a:p>
@@ -5818,6 +5820,1225 @@
 </p:sld>
 </file>
 
+<file path=ppt/slides/slide3.xml><?xml version="1.0" encoding="utf-8"?>
+<p:sld xmlns:a="http://schemas.openxmlformats.org/drawingml/2006/main" xmlns:r="http://schemas.openxmlformats.org/officeDocument/2006/relationships" xmlns:p="http://schemas.openxmlformats.org/presentationml/2006/main">
+  <p:cSld>
+    <p:spTree>
+      <p:nvGrpSpPr>
+        <p:cNvPr id="1" name=""/>
+        <p:cNvGrpSpPr/>
+        <p:nvPr/>
+      </p:nvGrpSpPr>
+      <p:grpSpPr>
+        <a:xfrm>
+          <a:off x="0" y="0"/>
+          <a:ext cx="0" cy="0"/>
+          <a:chOff x="0" y="0"/>
+          <a:chExt cx="0" cy="0"/>
+        </a:xfrm>
+      </p:grpSpPr>
+      <p:grpSp>
+        <p:nvGrpSpPr>
+          <p:cNvPr id="22" name="קבוצה 21">
+            <a:extLst>
+              <a:ext uri="{FF2B5EF4-FFF2-40B4-BE49-F238E27FC236}">
+                <a16:creationId xmlns:a16="http://schemas.microsoft.com/office/drawing/2014/main" id="{9D92F3CC-EF3C-4A4C-8F60-86C92413D673}"/>
+              </a:ext>
+            </a:extLst>
+          </p:cNvPr>
+          <p:cNvGrpSpPr/>
+          <p:nvPr/>
+        </p:nvGrpSpPr>
+        <p:grpSpPr>
+          <a:xfrm>
+            <a:off x="6394571" y="401215"/>
+            <a:ext cx="2806952" cy="2926875"/>
+            <a:chOff x="578498" y="578498"/>
+            <a:chExt cx="1838131" cy="4846737"/>
+          </a:xfrm>
+        </p:grpSpPr>
+        <p:sp>
+          <p:nvSpPr>
+            <p:cNvPr id="23" name="תיבת טקסט 22">
+              <a:extLst>
+                <a:ext uri="{FF2B5EF4-FFF2-40B4-BE49-F238E27FC236}">
+                  <a16:creationId xmlns:a16="http://schemas.microsoft.com/office/drawing/2014/main" id="{E8B01BE8-E842-4FC4-8C9B-54368247824F}"/>
+                </a:ext>
+              </a:extLst>
+            </p:cNvPr>
+            <p:cNvSpPr txBox="1"/>
+            <p:nvPr/>
+          </p:nvSpPr>
+          <p:spPr>
+            <a:xfrm>
+              <a:off x="578498" y="578498"/>
+              <a:ext cx="1838131" cy="1070287"/>
+            </a:xfrm>
+            <a:prstGeom prst="rect">
+              <a:avLst/>
+            </a:prstGeom>
+            <a:solidFill>
+              <a:schemeClr val="tx2">
+                <a:lumMod val="25000"/>
+                <a:lumOff val="75000"/>
+              </a:schemeClr>
+            </a:solidFill>
+            <a:ln w="28575">
+              <a:solidFill>
+                <a:srgbClr val="002060"/>
+              </a:solidFill>
+            </a:ln>
+          </p:spPr>
+          <p:txBody>
+            <a:bodyPr wrap="square" rtlCol="0">
+              <a:spAutoFit/>
+            </a:bodyPr>
+            <a:lstStyle/>
+            <a:p>
+              <a:pPr algn="l"/>
+              <a:r>
+                <a:rPr lang="en-US" dirty="0"/>
+                <a:t>Maze (abs)		</a:t>
+              </a:r>
+            </a:p>
+            <a:p>
+              <a:pPr algn="l"/>
+              <a:endParaRPr lang="en-IL" dirty="0"/>
+            </a:p>
+          </p:txBody>
+        </p:sp>
+        <p:sp>
+          <p:nvSpPr>
+            <p:cNvPr id="24" name="תיבת טקסט 23">
+              <a:extLst>
+                <a:ext uri="{FF2B5EF4-FFF2-40B4-BE49-F238E27FC236}">
+                  <a16:creationId xmlns:a16="http://schemas.microsoft.com/office/drawing/2014/main" id="{BD97B4A9-6837-48A8-8D16-AE323F68620E}"/>
+                </a:ext>
+              </a:extLst>
+            </p:cNvPr>
+            <p:cNvSpPr txBox="1"/>
+            <p:nvPr/>
+          </p:nvSpPr>
+          <p:spPr>
+            <a:xfrm>
+              <a:off x="578498" y="1195055"/>
+              <a:ext cx="1838131" cy="4230180"/>
+            </a:xfrm>
+            <a:prstGeom prst="rect">
+              <a:avLst/>
+            </a:prstGeom>
+            <a:solidFill>
+              <a:schemeClr val="accent3">
+                <a:lumMod val="40000"/>
+                <a:lumOff val="60000"/>
+              </a:schemeClr>
+            </a:solidFill>
+            <a:ln w="28575">
+              <a:solidFill>
+                <a:srgbClr val="002060"/>
+              </a:solidFill>
+            </a:ln>
+          </p:spPr>
+          <p:txBody>
+            <a:bodyPr wrap="square" rtlCol="0">
+              <a:spAutoFit/>
+            </a:bodyPr>
+            <a:lstStyle/>
+            <a:p>
+              <a:pPr algn="l"/>
+              <a:r>
+                <a:rPr lang="en-US" sz="1600" b="1" dirty="0" err="1"/>
+                <a:t>Parametrs</a:t>
+              </a:r>
+              <a:r>
+                <a:rPr lang="he-IL" sz="1600" b="1" dirty="0"/>
+                <a:t>:</a:t>
+              </a:r>
+            </a:p>
+            <a:p>
+              <a:pPr marL="285750" indent="-285750" algn="l">
+                <a:buFont typeface="Arial" panose="020B0604020202020204" pitchFamily="34" charset="0"/>
+                <a:buChar char="•"/>
+              </a:pPr>
+              <a:r>
+                <a:rPr lang="en-US" sz="1600" dirty="0"/>
+                <a:t>Maze : List[List[</a:t>
+              </a:r>
+              <a:r>
+                <a:rPr lang="en-US" sz="1600" dirty="0" err="1"/>
+                <a:t>Squre</a:t>
+              </a:r>
+              <a:r>
+                <a:rPr lang="en-US" sz="1600" dirty="0"/>
+                <a:t>]](6*6)</a:t>
+              </a:r>
+            </a:p>
+            <a:p>
+              <a:pPr marL="285750" indent="-285750" algn="l">
+                <a:buFont typeface="Arial" panose="020B0604020202020204" pitchFamily="34" charset="0"/>
+                <a:buChar char="•"/>
+              </a:pPr>
+              <a:endParaRPr lang="en-US" sz="1600" dirty="0"/>
+            </a:p>
+            <a:p>
+              <a:pPr algn="l"/>
+              <a:r>
+                <a:rPr lang="en-US" sz="1600" b="1" dirty="0"/>
+                <a:t>Functions:</a:t>
+              </a:r>
+            </a:p>
+            <a:p>
+              <a:pPr marL="285750" indent="-285750" algn="l">
+                <a:buFont typeface="Arial" panose="020B0604020202020204" pitchFamily="34" charset="0"/>
+                <a:buChar char="•"/>
+              </a:pPr>
+              <a:r>
+                <a:rPr lang="en-US" sz="1600" dirty="0" err="1"/>
+                <a:t>Find_Begin</a:t>
+              </a:r>
+              <a:endParaRPr lang="en-US" sz="1600" dirty="0"/>
+            </a:p>
+            <a:p>
+              <a:pPr marL="285750" indent="-285750" algn="l">
+                <a:buFont typeface="Arial" panose="020B0604020202020204" pitchFamily="34" charset="0"/>
+                <a:buChar char="•"/>
+              </a:pPr>
+              <a:r>
+                <a:rPr lang="en-US" sz="1600" dirty="0" err="1"/>
+                <a:t>Near_end</a:t>
+              </a:r>
+              <a:r>
+                <a:rPr lang="en-US" sz="1600" dirty="0"/>
+                <a:t>(</a:t>
+              </a:r>
+              <a:r>
+                <a:rPr lang="en-US" sz="1600" dirty="0" err="1"/>
+                <a:t>currSqure</a:t>
+              </a:r>
+              <a:r>
+                <a:rPr lang="en-US" sz="1600" dirty="0"/>
+                <a:t>: </a:t>
+              </a:r>
+              <a:r>
+                <a:rPr lang="en-US" sz="1600" dirty="0" err="1"/>
+                <a:t>SqureIndex</a:t>
+              </a:r>
+              <a:r>
+                <a:rPr lang="en-US" sz="1600" dirty="0"/>
+                <a:t>)</a:t>
+              </a:r>
+            </a:p>
+            <a:p>
+              <a:pPr marL="285750" indent="-285750" algn="l">
+                <a:buFont typeface="Arial" panose="020B0604020202020204" pitchFamily="34" charset="0"/>
+                <a:buChar char="•"/>
+              </a:pPr>
+              <a:r>
+                <a:rPr lang="en-US" sz="1600" dirty="0" err="1"/>
+                <a:t>Near_squre</a:t>
+              </a:r>
+              <a:r>
+                <a:rPr lang="en-US" sz="1600" dirty="0"/>
+                <a:t>(</a:t>
+              </a:r>
+              <a:r>
+                <a:rPr lang="en-US" sz="1600" dirty="0" err="1"/>
+                <a:t>currSqure</a:t>
+              </a:r>
+              <a:r>
+                <a:rPr lang="en-US" sz="1600" dirty="0"/>
+                <a:t>, direction)</a:t>
+              </a:r>
+            </a:p>
+            <a:p>
+              <a:pPr marL="285750" indent="-285750" algn="l">
+                <a:buFont typeface="Arial" panose="020B0604020202020204" pitchFamily="34" charset="0"/>
+                <a:buChar char="•"/>
+              </a:pPr>
+              <a:endParaRPr lang="en-US" sz="1600" dirty="0"/>
+            </a:p>
+          </p:txBody>
+        </p:sp>
+      </p:grpSp>
+      <p:grpSp>
+        <p:nvGrpSpPr>
+          <p:cNvPr id="25" name="קבוצה 24">
+            <a:extLst>
+              <a:ext uri="{FF2B5EF4-FFF2-40B4-BE49-F238E27FC236}">
+                <a16:creationId xmlns:a16="http://schemas.microsoft.com/office/drawing/2014/main" id="{B8FACD1C-C682-42B6-9331-64D50F04DB3A}"/>
+              </a:ext>
+            </a:extLst>
+          </p:cNvPr>
+          <p:cNvGrpSpPr/>
+          <p:nvPr/>
+        </p:nvGrpSpPr>
+        <p:grpSpPr>
+          <a:xfrm>
+            <a:off x="9811896" y="619536"/>
+            <a:ext cx="1838130" cy="1795718"/>
+            <a:chOff x="578498" y="578498"/>
+            <a:chExt cx="1838131" cy="2083033"/>
+          </a:xfrm>
+        </p:grpSpPr>
+        <p:sp>
+          <p:nvSpPr>
+            <p:cNvPr id="26" name="תיבת טקסט 25">
+              <a:extLst>
+                <a:ext uri="{FF2B5EF4-FFF2-40B4-BE49-F238E27FC236}">
+                  <a16:creationId xmlns:a16="http://schemas.microsoft.com/office/drawing/2014/main" id="{D98A5407-E025-42BB-AE1B-02A59FFBFF87}"/>
+                </a:ext>
+              </a:extLst>
+            </p:cNvPr>
+            <p:cNvSpPr txBox="1"/>
+            <p:nvPr/>
+          </p:nvSpPr>
+          <p:spPr>
+            <a:xfrm>
+              <a:off x="578498" y="578498"/>
+              <a:ext cx="1838131" cy="428425"/>
+            </a:xfrm>
+            <a:prstGeom prst="rect">
+              <a:avLst/>
+            </a:prstGeom>
+            <a:solidFill>
+              <a:schemeClr val="tx2">
+                <a:lumMod val="25000"/>
+                <a:lumOff val="75000"/>
+              </a:schemeClr>
+            </a:solidFill>
+            <a:ln w="28575">
+              <a:solidFill>
+                <a:srgbClr val="002060"/>
+              </a:solidFill>
+            </a:ln>
+          </p:spPr>
+          <p:txBody>
+            <a:bodyPr wrap="square" rtlCol="0">
+              <a:spAutoFit/>
+            </a:bodyPr>
+            <a:lstStyle/>
+            <a:p>
+              <a:pPr algn="l"/>
+              <a:r>
+                <a:rPr lang="en-US" dirty="0"/>
+                <a:t>Square (Enum)</a:t>
+              </a:r>
+              <a:endParaRPr lang="en-IL" dirty="0"/>
+            </a:p>
+          </p:txBody>
+        </p:sp>
+        <p:sp>
+          <p:nvSpPr>
+            <p:cNvPr id="27" name="תיבת טקסט 26">
+              <a:extLst>
+                <a:ext uri="{FF2B5EF4-FFF2-40B4-BE49-F238E27FC236}">
+                  <a16:creationId xmlns:a16="http://schemas.microsoft.com/office/drawing/2014/main" id="{AE355BB7-29CE-4A31-956D-82D49C9DE1D3}"/>
+                </a:ext>
+              </a:extLst>
+            </p:cNvPr>
+            <p:cNvSpPr txBox="1"/>
+            <p:nvPr/>
+          </p:nvSpPr>
+          <p:spPr>
+            <a:xfrm>
+              <a:off x="578498" y="947830"/>
+              <a:ext cx="1838131" cy="1713701"/>
+            </a:xfrm>
+            <a:prstGeom prst="rect">
+              <a:avLst/>
+            </a:prstGeom>
+            <a:solidFill>
+              <a:schemeClr val="accent3">
+                <a:lumMod val="40000"/>
+                <a:lumOff val="60000"/>
+              </a:schemeClr>
+            </a:solidFill>
+            <a:ln w="28575">
+              <a:solidFill>
+                <a:srgbClr val="002060"/>
+              </a:solidFill>
+            </a:ln>
+          </p:spPr>
+          <p:txBody>
+            <a:bodyPr wrap="square" rtlCol="0">
+              <a:spAutoFit/>
+            </a:bodyPr>
+            <a:lstStyle/>
+            <a:p>
+              <a:pPr marL="285750" indent="-285750" algn="l">
+                <a:buFont typeface="Arial" panose="020B0604020202020204" pitchFamily="34" charset="0"/>
+                <a:buChar char="•"/>
+              </a:pPr>
+              <a:r>
+                <a:rPr lang="en-US" dirty="0"/>
+                <a:t>Empty</a:t>
+              </a:r>
+            </a:p>
+            <a:p>
+              <a:pPr marL="285750" indent="-285750" algn="l">
+                <a:buFont typeface="Arial" panose="020B0604020202020204" pitchFamily="34" charset="0"/>
+                <a:buChar char="•"/>
+              </a:pPr>
+              <a:r>
+                <a:rPr lang="en-US" dirty="0"/>
+                <a:t>Wall</a:t>
+              </a:r>
+            </a:p>
+            <a:p>
+              <a:pPr marL="285750" indent="-285750" algn="l">
+                <a:buFont typeface="Arial" panose="020B0604020202020204" pitchFamily="34" charset="0"/>
+                <a:buChar char="•"/>
+              </a:pPr>
+              <a:r>
+                <a:rPr lang="en-US" dirty="0"/>
+                <a:t>Passport</a:t>
+              </a:r>
+            </a:p>
+            <a:p>
+              <a:pPr marL="285750" indent="-285750" algn="l">
+                <a:buFont typeface="Arial" panose="020B0604020202020204" pitchFamily="34" charset="0"/>
+                <a:buChar char="•"/>
+              </a:pPr>
+              <a:r>
+                <a:rPr lang="en-US" dirty="0" err="1"/>
+                <a:t>Beginng</a:t>
+              </a:r>
+              <a:endParaRPr lang="en-US" dirty="0"/>
+            </a:p>
+            <a:p>
+              <a:pPr marL="285750" indent="-285750" algn="l">
+                <a:buFont typeface="Arial" panose="020B0604020202020204" pitchFamily="34" charset="0"/>
+                <a:buChar char="•"/>
+              </a:pPr>
+              <a:r>
+                <a:rPr lang="en-US" dirty="0"/>
+                <a:t>End</a:t>
+              </a:r>
+            </a:p>
+          </p:txBody>
+        </p:sp>
+      </p:grpSp>
+      <p:grpSp>
+        <p:nvGrpSpPr>
+          <p:cNvPr id="31" name="קבוצה 30">
+            <a:extLst>
+              <a:ext uri="{FF2B5EF4-FFF2-40B4-BE49-F238E27FC236}">
+                <a16:creationId xmlns:a16="http://schemas.microsoft.com/office/drawing/2014/main" id="{F9020A38-05F7-4192-8877-69BB0B427D34}"/>
+              </a:ext>
+            </a:extLst>
+          </p:cNvPr>
+          <p:cNvGrpSpPr/>
+          <p:nvPr/>
+        </p:nvGrpSpPr>
+        <p:grpSpPr>
+          <a:xfrm>
+            <a:off x="318799" y="201240"/>
+            <a:ext cx="3142858" cy="3511651"/>
+            <a:chOff x="578498" y="578498"/>
+            <a:chExt cx="1838131" cy="5815089"/>
+          </a:xfrm>
+        </p:grpSpPr>
+        <p:sp>
+          <p:nvSpPr>
+            <p:cNvPr id="32" name="תיבת טקסט 31">
+              <a:extLst>
+                <a:ext uri="{FF2B5EF4-FFF2-40B4-BE49-F238E27FC236}">
+                  <a16:creationId xmlns:a16="http://schemas.microsoft.com/office/drawing/2014/main" id="{91271E46-A435-41D3-AB83-3BEE6C60A3A7}"/>
+                </a:ext>
+              </a:extLst>
+            </p:cNvPr>
+            <p:cNvSpPr txBox="1"/>
+            <p:nvPr/>
+          </p:nvSpPr>
+          <p:spPr>
+            <a:xfrm>
+              <a:off x="578498" y="578498"/>
+              <a:ext cx="1838131" cy="1528981"/>
+            </a:xfrm>
+            <a:prstGeom prst="rect">
+              <a:avLst/>
+            </a:prstGeom>
+            <a:solidFill>
+              <a:schemeClr val="tx2">
+                <a:lumMod val="25000"/>
+                <a:lumOff val="75000"/>
+              </a:schemeClr>
+            </a:solidFill>
+            <a:ln w="28575">
+              <a:solidFill>
+                <a:srgbClr val="002060"/>
+              </a:solidFill>
+            </a:ln>
+          </p:spPr>
+          <p:txBody>
+            <a:bodyPr wrap="square" rtlCol="0">
+              <a:spAutoFit/>
+            </a:bodyPr>
+            <a:lstStyle/>
+            <a:p>
+              <a:pPr algn="l"/>
+              <a:r>
+                <a:rPr lang="en-US" dirty="0" err="1"/>
+                <a:t>MazeAndPassports</a:t>
+              </a:r>
+              <a:r>
+                <a:rPr lang="en-US" dirty="0"/>
+                <a:t> 		</a:t>
+              </a:r>
+            </a:p>
+            <a:p>
+              <a:pPr algn="l"/>
+              <a:endParaRPr lang="en-IL" dirty="0"/>
+            </a:p>
+          </p:txBody>
+        </p:sp>
+        <p:sp>
+          <p:nvSpPr>
+            <p:cNvPr id="33" name="תיבת טקסט 32">
+              <a:extLst>
+                <a:ext uri="{FF2B5EF4-FFF2-40B4-BE49-F238E27FC236}">
+                  <a16:creationId xmlns:a16="http://schemas.microsoft.com/office/drawing/2014/main" id="{45C4AB08-9E19-47B3-88F0-D32BC7891E1A}"/>
+                </a:ext>
+              </a:extLst>
+            </p:cNvPr>
+            <p:cNvSpPr txBox="1"/>
+            <p:nvPr/>
+          </p:nvSpPr>
+          <p:spPr>
+            <a:xfrm>
+              <a:off x="578498" y="1195055"/>
+              <a:ext cx="1838131" cy="5198532"/>
+            </a:xfrm>
+            <a:prstGeom prst="rect">
+              <a:avLst/>
+            </a:prstGeom>
+            <a:solidFill>
+              <a:schemeClr val="accent3">
+                <a:lumMod val="40000"/>
+                <a:lumOff val="60000"/>
+              </a:schemeClr>
+            </a:solidFill>
+            <a:ln w="28575">
+              <a:solidFill>
+                <a:srgbClr val="002060"/>
+              </a:solidFill>
+            </a:ln>
+          </p:spPr>
+          <p:txBody>
+            <a:bodyPr wrap="square" rtlCol="0">
+              <a:spAutoFit/>
+            </a:bodyPr>
+            <a:lstStyle/>
+            <a:p>
+              <a:pPr algn="l"/>
+              <a:r>
+                <a:rPr lang="en-US" b="1" dirty="0" err="1"/>
+                <a:t>Parametrs</a:t>
+              </a:r>
+              <a:r>
+                <a:rPr lang="he-IL" b="1" dirty="0"/>
+                <a:t>:</a:t>
+              </a:r>
+            </a:p>
+            <a:p>
+              <a:pPr marL="285750" indent="-285750">
+                <a:buFont typeface="Arial" panose="020B0604020202020204" pitchFamily="34" charset="0"/>
+                <a:buChar char="•"/>
+              </a:pPr>
+              <a:r>
+                <a:rPr lang="en-US" dirty="0"/>
+                <a:t>Solutions: list[Maze]</a:t>
+              </a:r>
+            </a:p>
+            <a:p>
+              <a:pPr marL="285750" indent="-285750" algn="l">
+                <a:buFont typeface="Arial" panose="020B0604020202020204" pitchFamily="34" charset="0"/>
+                <a:buChar char="•"/>
+              </a:pPr>
+              <a:r>
+                <a:rPr lang="en-US" dirty="0" err="1"/>
+                <a:t>Base_maze</a:t>
+              </a:r>
+              <a:r>
+                <a:rPr lang="en-US" dirty="0"/>
+                <a:t>: Maze</a:t>
+              </a:r>
+            </a:p>
+            <a:p>
+              <a:pPr algn="l"/>
+              <a:endParaRPr lang="en-US" dirty="0"/>
+            </a:p>
+            <a:p>
+              <a:pPr algn="l"/>
+              <a:r>
+                <a:rPr lang="en-US" b="1" dirty="0"/>
+                <a:t>Functions:</a:t>
+              </a:r>
+            </a:p>
+            <a:p>
+              <a:pPr marL="285750" indent="-285750" algn="l">
+                <a:buFont typeface="Arial" panose="020B0604020202020204" pitchFamily="34" charset="0"/>
+                <a:buChar char="•"/>
+              </a:pPr>
+              <a:r>
+                <a:rPr lang="en-US" dirty="0" err="1"/>
+                <a:t>Recursive_get_sulotions</a:t>
+              </a:r>
+              <a:br>
+                <a:rPr lang="en-US" dirty="0"/>
+              </a:br>
+              <a:r>
+                <a:rPr lang="en-US" dirty="0"/>
+                <a:t>(</a:t>
+              </a:r>
+              <a:r>
+                <a:rPr lang="en-US" dirty="0" err="1"/>
+                <a:t>Base_maze</a:t>
+              </a:r>
+              <a:r>
+                <a:rPr lang="en-US" dirty="0"/>
+                <a:t>, </a:t>
+              </a:r>
+              <a:r>
+                <a:rPr lang="en-US" dirty="0" err="1"/>
+                <a:t>currSqure</a:t>
+              </a:r>
+              <a:r>
+                <a:rPr lang="en-US" dirty="0"/>
+                <a:t>, Solutions)</a:t>
+              </a:r>
+            </a:p>
+            <a:p>
+              <a:pPr marL="285750" indent="-285750" algn="l">
+                <a:buFont typeface="Arial" panose="020B0604020202020204" pitchFamily="34" charset="0"/>
+                <a:buChar char="•"/>
+              </a:pPr>
+              <a:endParaRPr lang="en-US" dirty="0"/>
+            </a:p>
+            <a:p>
+              <a:pPr marL="285750" indent="-285750" algn="l">
+                <a:buFont typeface="Arial" panose="020B0604020202020204" pitchFamily="34" charset="0"/>
+                <a:buChar char="•"/>
+              </a:pPr>
+              <a:endParaRPr lang="en-US" dirty="0"/>
+            </a:p>
+            <a:p>
+              <a:pPr marL="285750" indent="-285750" algn="l">
+                <a:buFont typeface="Arial" panose="020B0604020202020204" pitchFamily="34" charset="0"/>
+                <a:buChar char="•"/>
+              </a:pPr>
+              <a:endParaRPr lang="en-US" dirty="0"/>
+            </a:p>
+          </p:txBody>
+        </p:sp>
+      </p:grpSp>
+      <p:cxnSp>
+        <p:nvCxnSpPr>
+          <p:cNvPr id="37" name="מחבר: מרפקי 36">
+            <a:extLst>
+              <a:ext uri="{FF2B5EF4-FFF2-40B4-BE49-F238E27FC236}">
+                <a16:creationId xmlns:a16="http://schemas.microsoft.com/office/drawing/2014/main" id="{384234DC-833D-40F6-BF1B-7C380D7F572C}"/>
+              </a:ext>
+            </a:extLst>
+          </p:cNvPr>
+          <p:cNvCxnSpPr>
+            <a:cxnSpLocks/>
+            <a:endCxn id="23" idx="0"/>
+          </p:cNvCxnSpPr>
+          <p:nvPr/>
+        </p:nvCxnSpPr>
+        <p:spPr>
+          <a:xfrm flipV="1">
+            <a:off x="2920482" y="401215"/>
+            <a:ext cx="4877565" cy="923330"/>
+          </a:xfrm>
+          <a:prstGeom prst="bentConnector4">
+            <a:avLst>
+              <a:gd name="adj1" fmla="val 35613"/>
+              <a:gd name="adj2" fmla="val 124758"/>
+            </a:avLst>
+          </a:prstGeom>
+          <a:ln w="28575">
+            <a:solidFill>
+              <a:schemeClr val="tx1"/>
+            </a:solidFill>
+            <a:tailEnd type="triangle"/>
+          </a:ln>
+        </p:spPr>
+        <p:style>
+          <a:lnRef idx="1">
+            <a:schemeClr val="accent1"/>
+          </a:lnRef>
+          <a:fillRef idx="0">
+            <a:schemeClr val="accent1"/>
+          </a:fillRef>
+          <a:effectRef idx="0">
+            <a:schemeClr val="accent1"/>
+          </a:effectRef>
+          <a:fontRef idx="minor">
+            <a:schemeClr val="tx1"/>
+          </a:fontRef>
+        </p:style>
+      </p:cxnSp>
+      <p:cxnSp>
+        <p:nvCxnSpPr>
+          <p:cNvPr id="58" name="מחבר: מרפקי 57">
+            <a:extLst>
+              <a:ext uri="{FF2B5EF4-FFF2-40B4-BE49-F238E27FC236}">
+                <a16:creationId xmlns:a16="http://schemas.microsoft.com/office/drawing/2014/main" id="{EE1FDBDE-9229-48E4-A926-D5583C3406D5}"/>
+              </a:ext>
+            </a:extLst>
+          </p:cNvPr>
+          <p:cNvCxnSpPr>
+            <a:cxnSpLocks/>
+            <a:endCxn id="26" idx="0"/>
+          </p:cNvCxnSpPr>
+          <p:nvPr/>
+        </p:nvCxnSpPr>
+        <p:spPr>
+          <a:xfrm flipV="1">
+            <a:off x="9075571" y="619536"/>
+            <a:ext cx="1655390" cy="593278"/>
+          </a:xfrm>
+          <a:prstGeom prst="bentConnector4">
+            <a:avLst>
+              <a:gd name="adj1" fmla="val 22240"/>
+              <a:gd name="adj2" fmla="val 138532"/>
+            </a:avLst>
+          </a:prstGeom>
+          <a:ln w="28575">
+            <a:solidFill>
+              <a:schemeClr val="tx1"/>
+            </a:solidFill>
+            <a:tailEnd type="triangle"/>
+          </a:ln>
+        </p:spPr>
+        <p:style>
+          <a:lnRef idx="1">
+            <a:schemeClr val="accent1"/>
+          </a:lnRef>
+          <a:fillRef idx="0">
+            <a:schemeClr val="accent1"/>
+          </a:fillRef>
+          <a:effectRef idx="0">
+            <a:schemeClr val="accent1"/>
+          </a:effectRef>
+          <a:fontRef idx="minor">
+            <a:schemeClr val="tx1"/>
+          </a:fontRef>
+        </p:style>
+      </p:cxnSp>
+      <p:grpSp>
+        <p:nvGrpSpPr>
+          <p:cNvPr id="46" name="קבוצה 45">
+            <a:extLst>
+              <a:ext uri="{FF2B5EF4-FFF2-40B4-BE49-F238E27FC236}">
+                <a16:creationId xmlns:a16="http://schemas.microsoft.com/office/drawing/2014/main" id="{BD1211F5-9ED4-48A7-9BEF-FFE8852BAB06}"/>
+              </a:ext>
+            </a:extLst>
+          </p:cNvPr>
+          <p:cNvGrpSpPr/>
+          <p:nvPr/>
+        </p:nvGrpSpPr>
+        <p:grpSpPr>
+          <a:xfrm>
+            <a:off x="9903266" y="2781530"/>
+            <a:ext cx="1838130" cy="964721"/>
+            <a:chOff x="578498" y="578498"/>
+            <a:chExt cx="1838131" cy="1119076"/>
+          </a:xfrm>
+        </p:grpSpPr>
+        <p:sp>
+          <p:nvSpPr>
+            <p:cNvPr id="47" name="תיבת טקסט 46">
+              <a:extLst>
+                <a:ext uri="{FF2B5EF4-FFF2-40B4-BE49-F238E27FC236}">
+                  <a16:creationId xmlns:a16="http://schemas.microsoft.com/office/drawing/2014/main" id="{B2421D5D-56B5-47A1-ACDA-6D81A644A4BB}"/>
+                </a:ext>
+              </a:extLst>
+            </p:cNvPr>
+            <p:cNvSpPr txBox="1"/>
+            <p:nvPr/>
+          </p:nvSpPr>
+          <p:spPr>
+            <a:xfrm>
+              <a:off x="578498" y="578498"/>
+              <a:ext cx="1838131" cy="749744"/>
+            </a:xfrm>
+            <a:prstGeom prst="rect">
+              <a:avLst/>
+            </a:prstGeom>
+            <a:solidFill>
+              <a:schemeClr val="tx2">
+                <a:lumMod val="25000"/>
+                <a:lumOff val="75000"/>
+              </a:schemeClr>
+            </a:solidFill>
+            <a:ln w="28575">
+              <a:solidFill>
+                <a:srgbClr val="002060"/>
+              </a:solidFill>
+            </a:ln>
+          </p:spPr>
+          <p:txBody>
+            <a:bodyPr wrap="square" rtlCol="0">
+              <a:spAutoFit/>
+            </a:bodyPr>
+            <a:lstStyle/>
+            <a:p>
+              <a:pPr algn="l"/>
+              <a:r>
+                <a:rPr lang="en-US"/>
+                <a:t>SquareIndex</a:t>
+              </a:r>
+              <a:r>
+                <a:rPr lang="en-US" dirty="0"/>
+                <a:t> (Enum)</a:t>
+              </a:r>
+              <a:endParaRPr lang="en-IL" dirty="0"/>
+            </a:p>
+          </p:txBody>
+        </p:sp>
+        <p:sp>
+          <p:nvSpPr>
+            <p:cNvPr id="49" name="תיבת טקסט 48">
+              <a:extLst>
+                <a:ext uri="{FF2B5EF4-FFF2-40B4-BE49-F238E27FC236}">
+                  <a16:creationId xmlns:a16="http://schemas.microsoft.com/office/drawing/2014/main" id="{5CB869CB-33B4-4AD1-B349-55F1F3F38064}"/>
+                </a:ext>
+              </a:extLst>
+            </p:cNvPr>
+            <p:cNvSpPr txBox="1"/>
+            <p:nvPr/>
+          </p:nvSpPr>
+          <p:spPr>
+            <a:xfrm>
+              <a:off x="578498" y="947830"/>
+              <a:ext cx="1838131" cy="749744"/>
+            </a:xfrm>
+            <a:prstGeom prst="rect">
+              <a:avLst/>
+            </a:prstGeom>
+            <a:solidFill>
+              <a:schemeClr val="accent3">
+                <a:lumMod val="40000"/>
+                <a:lumOff val="60000"/>
+              </a:schemeClr>
+            </a:solidFill>
+            <a:ln w="28575">
+              <a:solidFill>
+                <a:srgbClr val="002060"/>
+              </a:solidFill>
+            </a:ln>
+          </p:spPr>
+          <p:txBody>
+            <a:bodyPr wrap="square" rtlCol="0">
+              <a:spAutoFit/>
+            </a:bodyPr>
+            <a:lstStyle/>
+            <a:p>
+              <a:pPr marL="285750" indent="-285750" algn="l">
+                <a:buFont typeface="Arial" panose="020B0604020202020204" pitchFamily="34" charset="0"/>
+                <a:buChar char="•"/>
+              </a:pPr>
+              <a:r>
+                <a:rPr lang="en-US" dirty="0"/>
+                <a:t>X</a:t>
+              </a:r>
+            </a:p>
+            <a:p>
+              <a:pPr marL="285750" indent="-285750" algn="l">
+                <a:buFont typeface="Arial" panose="020B0604020202020204" pitchFamily="34" charset="0"/>
+                <a:buChar char="•"/>
+              </a:pPr>
+              <a:r>
+                <a:rPr lang="en-US" dirty="0"/>
+                <a:t>Y</a:t>
+              </a:r>
+            </a:p>
+          </p:txBody>
+        </p:sp>
+      </p:grpSp>
+      <p:grpSp>
+        <p:nvGrpSpPr>
+          <p:cNvPr id="50" name="קבוצה 49">
+            <a:extLst>
+              <a:ext uri="{FF2B5EF4-FFF2-40B4-BE49-F238E27FC236}">
+                <a16:creationId xmlns:a16="http://schemas.microsoft.com/office/drawing/2014/main" id="{26A24041-9FF1-4B8F-9B34-C6CE7290DCA9}"/>
+              </a:ext>
+            </a:extLst>
+          </p:cNvPr>
+          <p:cNvGrpSpPr/>
+          <p:nvPr/>
+        </p:nvGrpSpPr>
+        <p:grpSpPr>
+          <a:xfrm>
+            <a:off x="9811896" y="4207916"/>
+            <a:ext cx="1838130" cy="1518719"/>
+            <a:chOff x="578498" y="578498"/>
+            <a:chExt cx="1838131" cy="1761714"/>
+          </a:xfrm>
+        </p:grpSpPr>
+        <p:sp>
+          <p:nvSpPr>
+            <p:cNvPr id="51" name="תיבת טקסט 50">
+              <a:extLst>
+                <a:ext uri="{FF2B5EF4-FFF2-40B4-BE49-F238E27FC236}">
+                  <a16:creationId xmlns:a16="http://schemas.microsoft.com/office/drawing/2014/main" id="{2725FC67-A79C-4CC2-85C8-44FD63BF052E}"/>
+                </a:ext>
+              </a:extLst>
+            </p:cNvPr>
+            <p:cNvSpPr txBox="1"/>
+            <p:nvPr/>
+          </p:nvSpPr>
+          <p:spPr>
+            <a:xfrm>
+              <a:off x="578498" y="578498"/>
+              <a:ext cx="1838131" cy="428425"/>
+            </a:xfrm>
+            <a:prstGeom prst="rect">
+              <a:avLst/>
+            </a:prstGeom>
+            <a:solidFill>
+              <a:schemeClr val="tx2">
+                <a:lumMod val="25000"/>
+                <a:lumOff val="75000"/>
+              </a:schemeClr>
+            </a:solidFill>
+            <a:ln w="28575">
+              <a:solidFill>
+                <a:srgbClr val="002060"/>
+              </a:solidFill>
+            </a:ln>
+          </p:spPr>
+          <p:txBody>
+            <a:bodyPr wrap="square" rtlCol="0">
+              <a:spAutoFit/>
+            </a:bodyPr>
+            <a:lstStyle/>
+            <a:p>
+              <a:pPr algn="l"/>
+              <a:r>
+                <a:rPr lang="en-US" dirty="0"/>
+                <a:t>Direction (Enum)</a:t>
+              </a:r>
+              <a:endParaRPr lang="en-IL" dirty="0"/>
+            </a:p>
+          </p:txBody>
+        </p:sp>
+        <p:sp>
+          <p:nvSpPr>
+            <p:cNvPr id="53" name="תיבת טקסט 52">
+              <a:extLst>
+                <a:ext uri="{FF2B5EF4-FFF2-40B4-BE49-F238E27FC236}">
+                  <a16:creationId xmlns:a16="http://schemas.microsoft.com/office/drawing/2014/main" id="{D6D8C3F3-1F45-43D6-A87E-715699397C61}"/>
+                </a:ext>
+              </a:extLst>
+            </p:cNvPr>
+            <p:cNvSpPr txBox="1"/>
+            <p:nvPr/>
+          </p:nvSpPr>
+          <p:spPr>
+            <a:xfrm>
+              <a:off x="578498" y="947830"/>
+              <a:ext cx="1838131" cy="1392382"/>
+            </a:xfrm>
+            <a:prstGeom prst="rect">
+              <a:avLst/>
+            </a:prstGeom>
+            <a:solidFill>
+              <a:schemeClr val="accent3">
+                <a:lumMod val="40000"/>
+                <a:lumOff val="60000"/>
+              </a:schemeClr>
+            </a:solidFill>
+            <a:ln w="28575">
+              <a:solidFill>
+                <a:srgbClr val="002060"/>
+              </a:solidFill>
+            </a:ln>
+          </p:spPr>
+          <p:txBody>
+            <a:bodyPr wrap="square" rtlCol="0">
+              <a:spAutoFit/>
+            </a:bodyPr>
+            <a:lstStyle/>
+            <a:p>
+              <a:pPr marL="285750" indent="-285750" algn="l">
+                <a:buFont typeface="Arial" panose="020B0604020202020204" pitchFamily="34" charset="0"/>
+                <a:buChar char="•"/>
+              </a:pPr>
+              <a:r>
+                <a:rPr lang="en-US" dirty="0"/>
+                <a:t>Up</a:t>
+              </a:r>
+            </a:p>
+            <a:p>
+              <a:pPr marL="285750" indent="-285750" algn="l">
+                <a:buFont typeface="Arial" panose="020B0604020202020204" pitchFamily="34" charset="0"/>
+                <a:buChar char="•"/>
+              </a:pPr>
+              <a:r>
+                <a:rPr lang="en-US" dirty="0"/>
+                <a:t>Right</a:t>
+              </a:r>
+            </a:p>
+            <a:p>
+              <a:pPr marL="285750" indent="-285750" algn="l">
+                <a:buFont typeface="Arial" panose="020B0604020202020204" pitchFamily="34" charset="0"/>
+                <a:buChar char="•"/>
+              </a:pPr>
+              <a:r>
+                <a:rPr lang="en-US" dirty="0"/>
+                <a:t>Down</a:t>
+              </a:r>
+            </a:p>
+            <a:p>
+              <a:pPr marL="285750" indent="-285750" algn="l">
+                <a:buFont typeface="Arial" panose="020B0604020202020204" pitchFamily="34" charset="0"/>
+                <a:buChar char="•"/>
+              </a:pPr>
+              <a:r>
+                <a:rPr lang="en-US" dirty="0"/>
+                <a:t>Left</a:t>
+              </a:r>
+            </a:p>
+          </p:txBody>
+        </p:sp>
+      </p:grpSp>
+      <p:cxnSp>
+        <p:nvCxnSpPr>
+          <p:cNvPr id="54" name="מחבר: מרפקי 53">
+            <a:extLst>
+              <a:ext uri="{FF2B5EF4-FFF2-40B4-BE49-F238E27FC236}">
+                <a16:creationId xmlns:a16="http://schemas.microsoft.com/office/drawing/2014/main" id="{A5B44060-FB4C-4BB8-84D5-2C4783F86691}"/>
+              </a:ext>
+            </a:extLst>
+          </p:cNvPr>
+          <p:cNvCxnSpPr>
+            <a:cxnSpLocks/>
+            <a:endCxn id="47" idx="0"/>
+          </p:cNvCxnSpPr>
+          <p:nvPr/>
+        </p:nvCxnSpPr>
+        <p:spPr>
+          <a:xfrm>
+            <a:off x="8836090" y="2643254"/>
+            <a:ext cx="1986241" cy="138276"/>
+          </a:xfrm>
+          <a:prstGeom prst="bentConnector2">
+            <a:avLst/>
+          </a:prstGeom>
+          <a:ln w="28575">
+            <a:solidFill>
+              <a:schemeClr val="tx1"/>
+            </a:solidFill>
+            <a:tailEnd type="triangle"/>
+          </a:ln>
+        </p:spPr>
+        <p:style>
+          <a:lnRef idx="1">
+            <a:schemeClr val="accent1"/>
+          </a:lnRef>
+          <a:fillRef idx="0">
+            <a:schemeClr val="accent1"/>
+          </a:fillRef>
+          <a:effectRef idx="0">
+            <a:schemeClr val="accent1"/>
+          </a:effectRef>
+          <a:fontRef idx="minor">
+            <a:schemeClr val="tx1"/>
+          </a:fontRef>
+        </p:style>
+      </p:cxnSp>
+      <p:cxnSp>
+        <p:nvCxnSpPr>
+          <p:cNvPr id="56" name="מחבר: מרפקי 55">
+            <a:extLst>
+              <a:ext uri="{FF2B5EF4-FFF2-40B4-BE49-F238E27FC236}">
+                <a16:creationId xmlns:a16="http://schemas.microsoft.com/office/drawing/2014/main" id="{FE90C425-828F-4D07-850B-AF424140F306}"/>
+              </a:ext>
+            </a:extLst>
+          </p:cNvPr>
+          <p:cNvCxnSpPr>
+            <a:cxnSpLocks/>
+            <a:endCxn id="51" idx="1"/>
+          </p:cNvCxnSpPr>
+          <p:nvPr/>
+        </p:nvCxnSpPr>
+        <p:spPr>
+          <a:xfrm rot="16200000" flipH="1">
+            <a:off x="8452744" y="3033430"/>
+            <a:ext cx="1742498" cy="975806"/>
+          </a:xfrm>
+          <a:prstGeom prst="bentConnector2">
+            <a:avLst/>
+          </a:prstGeom>
+          <a:ln w="28575">
+            <a:solidFill>
+              <a:schemeClr val="tx1"/>
+            </a:solidFill>
+            <a:tailEnd type="triangle"/>
+          </a:ln>
+        </p:spPr>
+        <p:style>
+          <a:lnRef idx="1">
+            <a:schemeClr val="accent1"/>
+          </a:lnRef>
+          <a:fillRef idx="0">
+            <a:schemeClr val="accent1"/>
+          </a:fillRef>
+          <a:effectRef idx="0">
+            <a:schemeClr val="accent1"/>
+          </a:effectRef>
+          <a:fontRef idx="minor">
+            <a:schemeClr val="tx1"/>
+          </a:fontRef>
+        </p:style>
+      </p:cxnSp>
+    </p:spTree>
+    <p:extLst>
+      <p:ext uri="{BB962C8B-B14F-4D97-AF65-F5344CB8AC3E}">
+        <p14:creationId xmlns:p14="http://schemas.microsoft.com/office/powerpoint/2010/main" val="785003467"/>
+      </p:ext>
+    </p:extLst>
+  </p:cSld>
+  <p:clrMapOvr>
+    <a:masterClrMapping/>
+  </p:clrMapOvr>
+</p:sld>
+</file>
+
+<file path=ppt/slides/slide4.xml><?xml version="1.0" encoding="utf-8"?>
+<p:sld xmlns:a="http://schemas.openxmlformats.org/drawingml/2006/main" xmlns:r="http://schemas.openxmlformats.org/officeDocument/2006/relationships" xmlns:p="http://schemas.openxmlformats.org/presentationml/2006/main">
+  <p:cSld>
+    <p:spTree>
+      <p:nvGrpSpPr>
+        <p:cNvPr id="1" name=""/>
+        <p:cNvGrpSpPr/>
+        <p:nvPr/>
+      </p:nvGrpSpPr>
+      <p:grpSpPr>
+        <a:xfrm>
+          <a:off x="0" y="0"/>
+          <a:ext cx="0" cy="0"/>
+          <a:chOff x="0" y="0"/>
+          <a:chExt cx="0" cy="0"/>
+        </a:xfrm>
+      </p:grpSpPr>
+      <p:sp>
+        <p:nvSpPr>
+          <p:cNvPr id="2" name="כותרת 1">
+            <a:extLst>
+              <a:ext uri="{FF2B5EF4-FFF2-40B4-BE49-F238E27FC236}">
+                <a16:creationId xmlns:a16="http://schemas.microsoft.com/office/drawing/2014/main" id="{473D1608-41EF-4526-9F53-D60F691EE898}"/>
+              </a:ext>
+            </a:extLst>
+          </p:cNvPr>
+          <p:cNvSpPr>
+            <a:spLocks noGrp="1"/>
+          </p:cNvSpPr>
+          <p:nvPr>
+            <p:ph type="title"/>
+          </p:nvPr>
+        </p:nvSpPr>
+        <p:spPr/>
+        <p:txBody>
+          <a:bodyPr/>
+          <a:lstStyle/>
+          <a:p>
+            <a:r>
+              <a:rPr lang="he-IL" dirty="0"/>
+              <a:t>מחלקות שצריך</a:t>
+            </a:r>
+            <a:endParaRPr lang="en-IL" dirty="0"/>
+          </a:p>
+        </p:txBody>
+      </p:sp>
+      <p:sp>
+        <p:nvSpPr>
+          <p:cNvPr id="3" name="מציין מיקום תוכן 2">
+            <a:extLst>
+              <a:ext uri="{FF2B5EF4-FFF2-40B4-BE49-F238E27FC236}">
+                <a16:creationId xmlns:a16="http://schemas.microsoft.com/office/drawing/2014/main" id="{5C224132-392B-4B17-9FDB-E0EDA1EF615F}"/>
+              </a:ext>
+            </a:extLst>
+          </p:cNvPr>
+          <p:cNvSpPr>
+            <a:spLocks noGrp="1"/>
+          </p:cNvSpPr>
+          <p:nvPr>
+            <p:ph idx="1"/>
+          </p:nvPr>
+        </p:nvSpPr>
+        <p:spPr/>
+        <p:txBody>
+          <a:bodyPr/>
+          <a:lstStyle/>
+          <a:p>
+            <a:pPr algn="r" rtl="1"/>
+            <a:r>
+              <a:rPr lang="en-US" dirty="0"/>
+              <a:t> square(Enum)</a:t>
+            </a:r>
+            <a:r>
+              <a:rPr lang="he-IL" dirty="0"/>
+              <a:t> – מחלקה שתייצג את כל האופציות למשבצת</a:t>
+            </a:r>
+          </a:p>
+          <a:p>
+            <a:pPr algn="r" rtl="1"/>
+            <a:r>
+              <a:rPr lang="en-US" dirty="0"/>
+              <a:t>Maze</a:t>
+            </a:r>
+            <a:r>
+              <a:rPr lang="he-IL" dirty="0"/>
+              <a:t> – מחלקה שתחזיק את המבוך, רשימה של רשימות של </a:t>
+            </a:r>
+            <a:r>
+              <a:rPr lang="en-US" dirty="0" err="1"/>
+              <a:t>squre</a:t>
+            </a:r>
+            <a:r>
+              <a:rPr lang="he-IL" dirty="0"/>
+              <a:t> (6*6):</a:t>
+            </a:r>
+            <a:br>
+              <a:rPr lang="en-US" dirty="0"/>
+            </a:br>
+            <a:r>
+              <a:rPr lang="he-IL" dirty="0"/>
+              <a:t>פונקציות: </a:t>
+            </a:r>
+          </a:p>
+          <a:p>
+            <a:pPr algn="r" rtl="1"/>
+            <a:r>
+              <a:rPr lang="en-US" dirty="0" err="1"/>
+              <a:t>MazeAndPassports</a:t>
+            </a:r>
+            <a:r>
+              <a:rPr lang="he-IL" dirty="0"/>
+              <a:t> – מחלקה שתנהל את התהליך</a:t>
+            </a:r>
+            <a:endParaRPr lang="en-IL" dirty="0"/>
+          </a:p>
+        </p:txBody>
+      </p:sp>
+    </p:spTree>
+    <p:extLst>
+      <p:ext uri="{BB962C8B-B14F-4D97-AF65-F5344CB8AC3E}">
+        <p14:creationId xmlns:p14="http://schemas.microsoft.com/office/powerpoint/2010/main" val="3585210905"/>
+      </p:ext>
+    </p:extLst>
+  </p:cSld>
+  <p:clrMapOvr>
+    <a:masterClrMapping/>
+  </p:clrMapOvr>
+</p:sld>
+</file>
+
 <file path=ppt/theme/theme1.xml><?xml version="1.0" encoding="utf-8"?>
 <a:theme xmlns:a="http://schemas.openxmlformats.org/drawingml/2006/main" name="מטרופולין">
   <a:themeElements>

</xml_diff>